<commit_message>
Output of question 2 and 3
</commit_message>
<xml_diff>
--- a/Football-Analysis.pptx
+++ b/Football-Analysis.pptx
@@ -5,7 +5,7 @@
     <p:sldMasterId id="2147483648" r:id="rId1"/>
   </p:sldMasterIdLst>
   <p:sldIdLst>
-    <p:sldId id="257" r:id="rId2"/>
+    <p:sldId id="258" r:id="rId2"/>
   </p:sldIdLst>
   <p:sldSz cx="12192000" cy="6858000"/>
   <p:notesSz cx="6858000" cy="9144000"/>
@@ -3328,10 +3328,10 @@
       </p:grpSpPr>
       <p:pic>
         <p:nvPicPr>
-          <p:cNvPr id="2" name="slide2" descr="Question1_Dashboard">
-            <a:extLst>
-              <a:ext uri="{FF2B5EF4-FFF2-40B4-BE49-F238E27FC236}">
-                <a16:creationId xmlns:a16="http://schemas.microsoft.com/office/drawing/2014/main" id="{75DAF767-483B-4C59-BCDD-C200FD72CE63}"/>
+          <p:cNvPr id="3" name="slide3" descr="Question2&amp;amp;3_Dashboard">
+            <a:extLst>
+              <a:ext uri="{FF2B5EF4-FFF2-40B4-BE49-F238E27FC236}">
+                <a16:creationId xmlns:a16="http://schemas.microsoft.com/office/drawing/2014/main" id="{8B04E71A-615C-4255-924E-A0765B63D198}"/>
               </a:ext>
             </a:extLst>
           </p:cNvPr>

</xml_diff>